<commit_message>
Added probing functions for fgen
</commit_message>
<xml_diff>
--- a/vignettes/package-logo.pptx
+++ b/vignettes/package-logo.pptx
@@ -105,6 +105,11 @@
       </a:defRPr>
     </a:lvl9pPr>
   </p:defaultTextStyle>
+  <p:extLst>
+    <p:ext uri="{EFAFB233-063F-42B5-8137-9DF3F51BA10A}">
+      <p15:sldGuideLst xmlns:p15="http://schemas.microsoft.com/office/powerpoint/2012/main"/>
+    </p:ext>
+  </p:extLst>
 </p:presentation>
 </file>
 
@@ -3530,10 +3535,10 @@
       </p:sp>
       <p:pic>
         <p:nvPicPr>
-          <p:cNvPr id="9" name="Picture 8">
-            <a:extLst>
-              <a:ext uri="{FF2B5EF4-FFF2-40B4-BE49-F238E27FC236}">
-                <a16:creationId xmlns:a16="http://schemas.microsoft.com/office/drawing/2014/main" id="{EE3A90EE-2BD1-764B-B9F6-E72F0C55EC04}"/>
+          <p:cNvPr id="2" name="Picture 1">
+            <a:extLst>
+              <a:ext uri="{FF2B5EF4-FFF2-40B4-BE49-F238E27FC236}">
+                <a16:creationId xmlns:a16="http://schemas.microsoft.com/office/drawing/2014/main" id="{613A58DE-A1D9-FC44-8FAF-D825E1DF072C}"/>
               </a:ext>
             </a:extLst>
           </p:cNvPr>
@@ -3550,8 +3555,8 @@
         </p:blipFill>
         <p:spPr>
           <a:xfrm>
-            <a:off x="1907240" y="1432892"/>
-            <a:ext cx="3009340" cy="3241849"/>
+            <a:off x="2154939" y="1485971"/>
+            <a:ext cx="2832970" cy="3399564"/>
           </a:xfrm>
           <a:prstGeom prst="rect">
             <a:avLst/>
@@ -3590,10 +3595,10 @@
       </p:grpSpPr>
       <p:grpSp>
         <p:nvGrpSpPr>
-          <p:cNvPr id="40" name="Group 39">
-            <a:extLst>
-              <a:ext uri="{FF2B5EF4-FFF2-40B4-BE49-F238E27FC236}">
-                <a16:creationId xmlns:a16="http://schemas.microsoft.com/office/drawing/2014/main" id="{53A1CF4A-7AA4-5244-A256-7CA4DE267EF0}"/>
+          <p:cNvPr id="3" name="Group 2">
+            <a:extLst>
+              <a:ext uri="{FF2B5EF4-FFF2-40B4-BE49-F238E27FC236}">
+                <a16:creationId xmlns:a16="http://schemas.microsoft.com/office/drawing/2014/main" id="{DA5414B3-BA2D-D241-A469-D3751F3A5223}"/>
               </a:ext>
             </a:extLst>
           </p:cNvPr>
@@ -3603,9 +3608,9 @@
         <p:grpSpPr>
           <a:xfrm>
             <a:off x="3274927" y="1081546"/>
-            <a:ext cx="5642145" cy="5312772"/>
+            <a:ext cx="5642145" cy="5312765"/>
             <a:chOff x="3274927" y="1081546"/>
-            <a:chExt cx="5642145" cy="5312772"/>
+            <a:chExt cx="5642145" cy="5312765"/>
           </a:xfrm>
         </p:grpSpPr>
         <p:sp>
@@ -3665,30 +3670,95 @@
             </a:p>
           </p:txBody>
         </p:sp>
-        <p:cxnSp>
-          <p:nvCxnSpPr>
-            <p:cNvPr id="26" name="Straight Connector 25">
+        <p:sp>
+          <p:nvSpPr>
+            <p:cNvPr id="8" name="Oval 7">
               <a:extLst>
                 <a:ext uri="{FF2B5EF4-FFF2-40B4-BE49-F238E27FC236}">
-                  <a16:creationId xmlns:a16="http://schemas.microsoft.com/office/drawing/2014/main" id="{F3DB4962-109F-2141-8A2C-22FD33F9875A}"/>
+                  <a16:creationId xmlns:a16="http://schemas.microsoft.com/office/drawing/2014/main" id="{5232829B-4FE4-874F-AD3E-F7B516B74F3A}"/>
                 </a:ext>
               </a:extLst>
             </p:cNvPr>
-            <p:cNvCxnSpPr/>
+            <p:cNvSpPr>
+              <a:spLocks/>
+            </p:cNvSpPr>
+            <p:nvPr/>
+          </p:nvSpPr>
+          <p:spPr>
+            <a:xfrm>
+              <a:off x="4572662" y="3285898"/>
+              <a:ext cx="284694" cy="284694"/>
+            </a:xfrm>
+            <a:prstGeom prst="ellipse">
+              <a:avLst/>
+            </a:prstGeom>
+            <a:solidFill>
+              <a:schemeClr val="bg1">
+                <a:lumMod val="85000"/>
+              </a:schemeClr>
+            </a:solidFill>
+            <a:ln w="44450">
+              <a:solidFill>
+                <a:schemeClr val="tx1"/>
+              </a:solidFill>
+              <a:round/>
+            </a:ln>
+          </p:spPr>
+          <p:style>
+            <a:lnRef idx="2">
+              <a:schemeClr val="accent1">
+                <a:shade val="50000"/>
+              </a:schemeClr>
+            </a:lnRef>
+            <a:fillRef idx="1">
+              <a:schemeClr val="accent1"/>
+            </a:fillRef>
+            <a:effectRef idx="0">
+              <a:schemeClr val="accent1"/>
+            </a:effectRef>
+            <a:fontRef idx="minor">
+              <a:schemeClr val="lt1"/>
+            </a:fontRef>
+          </p:style>
+          <p:txBody>
+            <a:bodyPr rtlCol="0" anchor="ctr"/>
+            <a:lstStyle/>
+            <a:p>
+              <a:pPr algn="ctr"/>
+              <a:endParaRPr lang="en-RS"/>
+            </a:p>
+          </p:txBody>
+        </p:sp>
+        <p:cxnSp>
+          <p:nvCxnSpPr>
+            <p:cNvPr id="9" name="Straight Connector 8">
+              <a:extLst>
+                <a:ext uri="{FF2B5EF4-FFF2-40B4-BE49-F238E27FC236}">
+                  <a16:creationId xmlns:a16="http://schemas.microsoft.com/office/drawing/2014/main" id="{A7C3E16D-AFB1-8141-A9B7-DF25ACA4C6DA}"/>
+                </a:ext>
+              </a:extLst>
+            </p:cNvPr>
+            <p:cNvCxnSpPr>
+              <a:cxnSpLocks/>
+              <a:stCxn id="8" idx="3"/>
+            </p:cNvCxnSpPr>
             <p:nvPr/>
           </p:nvCxnSpPr>
           <p:spPr>
-            <a:xfrm flipH="1" flipV="1">
-              <a:off x="4459739" y="5415618"/>
-              <a:ext cx="3251971" cy="6010"/>
+            <a:xfrm flipH="1">
+              <a:off x="4150305" y="3528900"/>
+              <a:ext cx="464049" cy="659304"/>
             </a:xfrm>
             <a:prstGeom prst="line">
               <a:avLst/>
             </a:prstGeom>
-            <a:ln w="76200">
+            <a:ln w="44450">
               <a:solidFill>
                 <a:schemeClr val="tx1"/>
               </a:solidFill>
+              <a:round/>
+              <a:headEnd type="none" w="med" len="med"/>
+              <a:tailEnd type="oval" w="med" len="med"/>
             </a:ln>
           </p:spPr>
           <p:style>
@@ -3706,113 +3776,714 @@
             </a:fontRef>
           </p:style>
         </p:cxnSp>
-        <p:grpSp>
-          <p:nvGrpSpPr>
-            <p:cNvPr id="37" name="Group 36">
+        <p:cxnSp>
+          <p:nvCxnSpPr>
+            <p:cNvPr id="10" name="Straight Connector 9">
               <a:extLst>
                 <a:ext uri="{FF2B5EF4-FFF2-40B4-BE49-F238E27FC236}">
-                  <a16:creationId xmlns:a16="http://schemas.microsoft.com/office/drawing/2014/main" id="{CB343032-A640-414D-8B5C-2AAA581DEBDC}"/>
+                  <a16:creationId xmlns:a16="http://schemas.microsoft.com/office/drawing/2014/main" id="{4C78EF6A-DEA4-CC40-B42A-86277E9A9A69}"/>
                 </a:ext>
               </a:extLst>
             </p:cNvPr>
-            <p:cNvGrpSpPr>
-              <a:grpSpLocks noChangeAspect="1"/>
-            </p:cNvGrpSpPr>
+            <p:cNvCxnSpPr>
+              <a:cxnSpLocks/>
+            </p:cNvCxnSpPr>
+            <p:nvPr/>
+          </p:nvCxnSpPr>
+          <p:spPr>
+            <a:xfrm flipH="1">
+              <a:off x="4150305" y="4188203"/>
+              <a:ext cx="601537" cy="0"/>
+            </a:xfrm>
+            <a:prstGeom prst="line">
+              <a:avLst/>
+            </a:prstGeom>
+            <a:ln w="44450">
+              <a:solidFill>
+                <a:schemeClr val="tx1"/>
+              </a:solidFill>
+              <a:round/>
+              <a:headEnd type="oval" w="med" len="med"/>
+              <a:tailEnd type="oval" w="med" len="med"/>
+            </a:ln>
+          </p:spPr>
+          <p:style>
+            <a:lnRef idx="1">
+              <a:schemeClr val="accent1"/>
+            </a:lnRef>
+            <a:fillRef idx="0">
+              <a:schemeClr val="accent1"/>
+            </a:fillRef>
+            <a:effectRef idx="0">
+              <a:schemeClr val="accent1"/>
+            </a:effectRef>
+            <a:fontRef idx="minor">
+              <a:schemeClr val="tx1"/>
+            </a:fontRef>
+          </p:style>
+        </p:cxnSp>
+        <p:cxnSp>
+          <p:nvCxnSpPr>
+            <p:cNvPr id="11" name="Straight Connector 10">
+              <a:extLst>
+                <a:ext uri="{FF2B5EF4-FFF2-40B4-BE49-F238E27FC236}">
+                  <a16:creationId xmlns:a16="http://schemas.microsoft.com/office/drawing/2014/main" id="{BBB32599-FB6A-BC46-B045-50D357431772}"/>
+                </a:ext>
+              </a:extLst>
+            </p:cNvPr>
+            <p:cNvCxnSpPr>
+              <a:cxnSpLocks/>
+            </p:cNvCxnSpPr>
+            <p:nvPr/>
+          </p:nvCxnSpPr>
+          <p:spPr>
+            <a:xfrm flipH="1">
+              <a:off x="4233497" y="4188203"/>
+              <a:ext cx="518346" cy="531144"/>
+            </a:xfrm>
+            <a:prstGeom prst="line">
+              <a:avLst/>
+            </a:prstGeom>
+            <a:ln w="44450">
+              <a:solidFill>
+                <a:schemeClr val="tx1"/>
+              </a:solidFill>
+              <a:round/>
+              <a:headEnd type="oval" w="med" len="med"/>
+              <a:tailEnd type="oval" w="med" len="med"/>
+            </a:ln>
+          </p:spPr>
+          <p:style>
+            <a:lnRef idx="1">
+              <a:schemeClr val="accent1"/>
+            </a:lnRef>
+            <a:fillRef idx="0">
+              <a:schemeClr val="accent1"/>
+            </a:fillRef>
+            <a:effectRef idx="0">
+              <a:schemeClr val="accent1"/>
+            </a:effectRef>
+            <a:fontRef idx="minor">
+              <a:schemeClr val="tx1"/>
+            </a:fontRef>
+          </p:style>
+        </p:cxnSp>
+        <p:sp>
+          <p:nvSpPr>
+            <p:cNvPr id="12" name="Triangle 11">
+              <a:extLst>
+                <a:ext uri="{FF2B5EF4-FFF2-40B4-BE49-F238E27FC236}">
+                  <a16:creationId xmlns:a16="http://schemas.microsoft.com/office/drawing/2014/main" id="{A7E2B55F-B1E1-0448-BA8C-7E22E6AD7025}"/>
+                </a:ext>
+              </a:extLst>
+            </p:cNvPr>
+            <p:cNvSpPr>
+              <a:spLocks/>
+            </p:cNvSpPr>
+            <p:nvPr/>
+          </p:nvSpPr>
+          <p:spPr>
+            <a:xfrm rot="7485185" flipH="1">
+              <a:off x="4201910" y="4737468"/>
+              <a:ext cx="151271" cy="204778"/>
+            </a:xfrm>
+            <a:prstGeom prst="triangle">
+              <a:avLst/>
+            </a:prstGeom>
+            <a:solidFill>
+              <a:schemeClr val="bg1">
+                <a:lumMod val="95000"/>
+              </a:schemeClr>
+            </a:solidFill>
+            <a:ln w="44450">
+              <a:solidFill>
+                <a:schemeClr val="tx1"/>
+              </a:solidFill>
+              <a:round/>
+            </a:ln>
+          </p:spPr>
+          <p:style>
+            <a:lnRef idx="2">
+              <a:schemeClr val="accent1">
+                <a:shade val="50000"/>
+              </a:schemeClr>
+            </a:lnRef>
+            <a:fillRef idx="1">
+              <a:schemeClr val="accent1"/>
+            </a:fillRef>
+            <a:effectRef idx="0">
+              <a:schemeClr val="accent1"/>
+            </a:effectRef>
+            <a:fontRef idx="minor">
+              <a:schemeClr val="lt1"/>
+            </a:fontRef>
+          </p:style>
+          <p:txBody>
+            <a:bodyPr rtlCol="0" anchor="ctr"/>
+            <a:lstStyle/>
+            <a:p>
+              <a:pPr algn="ctr"/>
+              <a:endParaRPr lang="en-RS"/>
+            </a:p>
+          </p:txBody>
+        </p:sp>
+        <p:sp>
+          <p:nvSpPr>
+            <p:cNvPr id="14" name="Oval 13">
+              <a:extLst>
+                <a:ext uri="{FF2B5EF4-FFF2-40B4-BE49-F238E27FC236}">
+                  <a16:creationId xmlns:a16="http://schemas.microsoft.com/office/drawing/2014/main" id="{03B4165E-1977-8D4A-877F-D2628193B194}"/>
+                </a:ext>
+              </a:extLst>
+            </p:cNvPr>
+            <p:cNvSpPr>
+              <a:spLocks/>
+            </p:cNvSpPr>
+            <p:nvPr/>
+          </p:nvSpPr>
+          <p:spPr>
+            <a:xfrm>
+              <a:off x="5911178" y="2272839"/>
+              <a:ext cx="284694" cy="284694"/>
+            </a:xfrm>
+            <a:prstGeom prst="ellipse">
+              <a:avLst/>
+            </a:prstGeom>
+            <a:solidFill>
+              <a:schemeClr val="bg1">
+                <a:lumMod val="85000"/>
+              </a:schemeClr>
+            </a:solidFill>
+            <a:ln w="44450">
+              <a:solidFill>
+                <a:schemeClr val="tx1"/>
+              </a:solidFill>
+              <a:round/>
+            </a:ln>
+          </p:spPr>
+          <p:style>
+            <a:lnRef idx="2">
+              <a:schemeClr val="accent1">
+                <a:shade val="50000"/>
+              </a:schemeClr>
+            </a:lnRef>
+            <a:fillRef idx="1">
+              <a:schemeClr val="accent1"/>
+            </a:fillRef>
+            <a:effectRef idx="0">
+              <a:schemeClr val="accent1"/>
+            </a:effectRef>
+            <a:fontRef idx="minor">
+              <a:schemeClr val="lt1"/>
+            </a:fontRef>
+          </p:style>
+          <p:txBody>
+            <a:bodyPr rtlCol="0" anchor="ctr"/>
+            <a:lstStyle/>
+            <a:p>
+              <a:pPr algn="ctr"/>
+              <a:endParaRPr lang="en-RS"/>
+            </a:p>
+          </p:txBody>
+        </p:sp>
+        <p:cxnSp>
+          <p:nvCxnSpPr>
+            <p:cNvPr id="15" name="Straight Connector 14">
+              <a:extLst>
+                <a:ext uri="{FF2B5EF4-FFF2-40B4-BE49-F238E27FC236}">
+                  <a16:creationId xmlns:a16="http://schemas.microsoft.com/office/drawing/2014/main" id="{3B89A510-C576-3A40-86D2-78F432992629}"/>
+                </a:ext>
+              </a:extLst>
+            </p:cNvPr>
+            <p:cNvCxnSpPr>
+              <a:cxnSpLocks/>
+            </p:cNvCxnSpPr>
+            <p:nvPr/>
+          </p:nvCxnSpPr>
+          <p:spPr>
+            <a:xfrm rot="19560000" flipH="1">
+              <a:off x="5811896" y="2641655"/>
+              <a:ext cx="464049" cy="659303"/>
+            </a:xfrm>
+            <a:prstGeom prst="line">
+              <a:avLst/>
+            </a:prstGeom>
+            <a:ln w="44450">
+              <a:solidFill>
+                <a:schemeClr val="tx1"/>
+              </a:solidFill>
+              <a:round/>
+              <a:headEnd type="none" w="med" len="med"/>
+              <a:tailEnd type="oval" w="med" len="med"/>
+            </a:ln>
+          </p:spPr>
+          <p:style>
+            <a:lnRef idx="1">
+              <a:schemeClr val="accent1"/>
+            </a:lnRef>
+            <a:fillRef idx="0">
+              <a:schemeClr val="accent1"/>
+            </a:fillRef>
+            <a:effectRef idx="0">
+              <a:schemeClr val="accent1"/>
+            </a:effectRef>
+            <a:fontRef idx="minor">
+              <a:schemeClr val="tx1"/>
+            </a:fontRef>
+          </p:style>
+        </p:cxnSp>
+        <p:cxnSp>
+          <p:nvCxnSpPr>
+            <p:cNvPr id="16" name="Straight Connector 15">
+              <a:extLst>
+                <a:ext uri="{FF2B5EF4-FFF2-40B4-BE49-F238E27FC236}">
+                  <a16:creationId xmlns:a16="http://schemas.microsoft.com/office/drawing/2014/main" id="{5C491683-1688-694B-8334-9CF4E5116BEA}"/>
+                </a:ext>
+              </a:extLst>
+            </p:cNvPr>
+            <p:cNvCxnSpPr>
+              <a:cxnSpLocks/>
+            </p:cNvCxnSpPr>
+            <p:nvPr/>
+          </p:nvCxnSpPr>
+          <p:spPr>
+            <a:xfrm rot="5460000" flipH="1">
+              <a:off x="5730369" y="3674171"/>
+              <a:ext cx="601538" cy="0"/>
+            </a:xfrm>
+            <a:prstGeom prst="line">
+              <a:avLst/>
+            </a:prstGeom>
+            <a:ln w="44450">
+              <a:solidFill>
+                <a:schemeClr val="tx1"/>
+              </a:solidFill>
+              <a:round/>
+              <a:headEnd type="oval" w="med" len="med"/>
+              <a:tailEnd type="oval" w="med" len="med"/>
+            </a:ln>
+          </p:spPr>
+          <p:style>
+            <a:lnRef idx="1">
+              <a:schemeClr val="accent1"/>
+            </a:lnRef>
+            <a:fillRef idx="0">
+              <a:schemeClr val="accent1"/>
+            </a:fillRef>
+            <a:effectRef idx="0">
+              <a:schemeClr val="accent1"/>
+            </a:effectRef>
+            <a:fontRef idx="minor">
+              <a:schemeClr val="tx1"/>
+            </a:fontRef>
+          </p:style>
+        </p:cxnSp>
+        <p:cxnSp>
+          <p:nvCxnSpPr>
+            <p:cNvPr id="17" name="Straight Connector 16">
+              <a:extLst>
+                <a:ext uri="{FF2B5EF4-FFF2-40B4-BE49-F238E27FC236}">
+                  <a16:creationId xmlns:a16="http://schemas.microsoft.com/office/drawing/2014/main" id="{3AB958A5-A873-F34A-ADE7-E9403341E93D}"/>
+                </a:ext>
+              </a:extLst>
+            </p:cNvPr>
+            <p:cNvCxnSpPr>
+              <a:cxnSpLocks/>
+            </p:cNvCxnSpPr>
+            <p:nvPr/>
+          </p:nvCxnSpPr>
+          <p:spPr>
+            <a:xfrm rot="18960000" flipH="1">
+              <a:off x="5765458" y="4082702"/>
+              <a:ext cx="518346" cy="531144"/>
+            </a:xfrm>
+            <a:prstGeom prst="line">
+              <a:avLst/>
+            </a:prstGeom>
+            <a:ln w="44450">
+              <a:solidFill>
+                <a:schemeClr val="tx1"/>
+              </a:solidFill>
+              <a:round/>
+              <a:headEnd type="oval" w="med" len="med"/>
+              <a:tailEnd type="oval" w="med" len="med"/>
+            </a:ln>
+          </p:spPr>
+          <p:style>
+            <a:lnRef idx="1">
+              <a:schemeClr val="accent1"/>
+            </a:lnRef>
+            <a:fillRef idx="0">
+              <a:schemeClr val="accent1"/>
+            </a:fillRef>
+            <a:effectRef idx="0">
+              <a:schemeClr val="accent1"/>
+            </a:effectRef>
+            <a:fontRef idx="minor">
+              <a:schemeClr val="tx1"/>
+            </a:fontRef>
+          </p:style>
+        </p:cxnSp>
+        <p:sp>
+          <p:nvSpPr>
+            <p:cNvPr id="18" name="Triangle 17">
+              <a:extLst>
+                <a:ext uri="{FF2B5EF4-FFF2-40B4-BE49-F238E27FC236}">
+                  <a16:creationId xmlns:a16="http://schemas.microsoft.com/office/drawing/2014/main" id="{83B23A44-63A4-DE4E-B0AF-FA567DA33779}"/>
+                </a:ext>
+              </a:extLst>
+            </p:cNvPr>
+            <p:cNvSpPr>
+              <a:spLocks/>
+            </p:cNvSpPr>
+            <p:nvPr/>
+          </p:nvSpPr>
+          <p:spPr>
+            <a:xfrm rot="8760000" flipH="1">
+              <a:off x="5955504" y="4712901"/>
+              <a:ext cx="151271" cy="204778"/>
+            </a:xfrm>
+            <a:prstGeom prst="triangle">
+              <a:avLst/>
+            </a:prstGeom>
+            <a:solidFill>
+              <a:schemeClr val="bg1">
+                <a:lumMod val="95000"/>
+              </a:schemeClr>
+            </a:solidFill>
+            <a:ln w="44450">
+              <a:solidFill>
+                <a:schemeClr val="tx1"/>
+              </a:solidFill>
+              <a:round/>
+            </a:ln>
+          </p:spPr>
+          <p:style>
+            <a:lnRef idx="2">
+              <a:schemeClr val="accent1">
+                <a:shade val="50000"/>
+              </a:schemeClr>
+            </a:lnRef>
+            <a:fillRef idx="1">
+              <a:schemeClr val="accent1"/>
+            </a:fillRef>
+            <a:effectRef idx="0">
+              <a:schemeClr val="accent1"/>
+            </a:effectRef>
+            <a:fontRef idx="minor">
+              <a:schemeClr val="lt1"/>
+            </a:fontRef>
+          </p:style>
+          <p:txBody>
+            <a:bodyPr rtlCol="0" anchor="ctr"/>
+            <a:lstStyle/>
+            <a:p>
+              <a:pPr algn="ctr"/>
+              <a:endParaRPr lang="en-RS"/>
+            </a:p>
+          </p:txBody>
+        </p:sp>
+        <p:sp>
+          <p:nvSpPr>
+            <p:cNvPr id="20" name="Oval 19">
+              <a:extLst>
+                <a:ext uri="{FF2B5EF4-FFF2-40B4-BE49-F238E27FC236}">
+                  <a16:creationId xmlns:a16="http://schemas.microsoft.com/office/drawing/2014/main" id="{40BFDE82-F932-FC4A-A633-2BBF515AF604}"/>
+                </a:ext>
+              </a:extLst>
+            </p:cNvPr>
+            <p:cNvSpPr>
+              <a:spLocks/>
+            </p:cNvSpPr>
+            <p:nvPr/>
+          </p:nvSpPr>
+          <p:spPr>
+            <a:xfrm>
+              <a:off x="7464196" y="1741693"/>
+              <a:ext cx="284694" cy="284694"/>
+            </a:xfrm>
+            <a:prstGeom prst="ellipse">
+              <a:avLst/>
+            </a:prstGeom>
+            <a:solidFill>
+              <a:schemeClr val="bg1">
+                <a:lumMod val="85000"/>
+              </a:schemeClr>
+            </a:solidFill>
+            <a:ln w="44450">
+              <a:solidFill>
+                <a:schemeClr val="tx1"/>
+              </a:solidFill>
+              <a:round/>
+            </a:ln>
+          </p:spPr>
+          <p:style>
+            <a:lnRef idx="2">
+              <a:schemeClr val="accent1">
+                <a:shade val="50000"/>
+              </a:schemeClr>
+            </a:lnRef>
+            <a:fillRef idx="1">
+              <a:schemeClr val="accent1"/>
+            </a:fillRef>
+            <a:effectRef idx="0">
+              <a:schemeClr val="accent1"/>
+            </a:effectRef>
+            <a:fontRef idx="minor">
+              <a:schemeClr val="lt1"/>
+            </a:fontRef>
+          </p:style>
+          <p:txBody>
+            <a:bodyPr rtlCol="0" anchor="ctr"/>
+            <a:lstStyle/>
+            <a:p>
+              <a:pPr algn="ctr"/>
+              <a:endParaRPr lang="en-RS"/>
+            </a:p>
+          </p:txBody>
+        </p:sp>
+        <p:cxnSp>
+          <p:nvCxnSpPr>
+            <p:cNvPr id="21" name="Straight Connector 20">
+              <a:extLst>
+                <a:ext uri="{FF2B5EF4-FFF2-40B4-BE49-F238E27FC236}">
+                  <a16:creationId xmlns:a16="http://schemas.microsoft.com/office/drawing/2014/main" id="{D67152B3-FA31-BC48-B8C0-D85A9DBFA312}"/>
+                </a:ext>
+              </a:extLst>
+            </p:cNvPr>
+            <p:cNvCxnSpPr>
+              <a:cxnSpLocks/>
+            </p:cNvCxnSpPr>
+            <p:nvPr/>
+          </p:nvCxnSpPr>
+          <p:spPr>
+            <a:xfrm rot="19560000" flipH="1">
+              <a:off x="7364913" y="2110509"/>
+              <a:ext cx="464049" cy="659303"/>
+            </a:xfrm>
+            <a:prstGeom prst="line">
+              <a:avLst/>
+            </a:prstGeom>
+            <a:ln w="44450">
+              <a:solidFill>
+                <a:schemeClr val="tx1"/>
+              </a:solidFill>
+              <a:round/>
+              <a:headEnd type="none" w="med" len="med"/>
+              <a:tailEnd type="oval" w="med" len="med"/>
+            </a:ln>
+          </p:spPr>
+          <p:style>
+            <a:lnRef idx="1">
+              <a:schemeClr val="accent1"/>
+            </a:lnRef>
+            <a:fillRef idx="0">
+              <a:schemeClr val="accent1"/>
+            </a:fillRef>
+            <a:effectRef idx="0">
+              <a:schemeClr val="accent1"/>
+            </a:effectRef>
+            <a:fontRef idx="minor">
+              <a:schemeClr val="tx1"/>
+            </a:fontRef>
+          </p:style>
+        </p:cxnSp>
+        <p:cxnSp>
+          <p:nvCxnSpPr>
+            <p:cNvPr id="22" name="Straight Connector 21">
+              <a:extLst>
+                <a:ext uri="{FF2B5EF4-FFF2-40B4-BE49-F238E27FC236}">
+                  <a16:creationId xmlns:a16="http://schemas.microsoft.com/office/drawing/2014/main" id="{6A7CA33A-AC14-7C4A-A3A6-DDE88ED94C1F}"/>
+                </a:ext>
+              </a:extLst>
+            </p:cNvPr>
+            <p:cNvCxnSpPr>
+              <a:cxnSpLocks/>
+            </p:cNvCxnSpPr>
+            <p:nvPr/>
+          </p:nvCxnSpPr>
+          <p:spPr>
+            <a:xfrm rot="5460000" flipH="1">
+              <a:off x="7283387" y="3143025"/>
+              <a:ext cx="601538" cy="0"/>
+            </a:xfrm>
+            <a:prstGeom prst="line">
+              <a:avLst/>
+            </a:prstGeom>
+            <a:ln w="44450">
+              <a:solidFill>
+                <a:schemeClr val="tx1"/>
+              </a:solidFill>
+              <a:round/>
+              <a:headEnd type="oval" w="med" len="med"/>
+              <a:tailEnd type="oval" w="med" len="med"/>
+            </a:ln>
+          </p:spPr>
+          <p:style>
+            <a:lnRef idx="1">
+              <a:schemeClr val="accent1"/>
+            </a:lnRef>
+            <a:fillRef idx="0">
+              <a:schemeClr val="accent1"/>
+            </a:fillRef>
+            <a:effectRef idx="0">
+              <a:schemeClr val="accent1"/>
+            </a:effectRef>
+            <a:fontRef idx="minor">
+              <a:schemeClr val="tx1"/>
+            </a:fontRef>
+          </p:style>
+        </p:cxnSp>
+        <p:cxnSp>
+          <p:nvCxnSpPr>
+            <p:cNvPr id="23" name="Straight Connector 22">
+              <a:extLst>
+                <a:ext uri="{FF2B5EF4-FFF2-40B4-BE49-F238E27FC236}">
+                  <a16:creationId xmlns:a16="http://schemas.microsoft.com/office/drawing/2014/main" id="{2586C563-ED7D-8940-B52D-EC42A220F5D1}"/>
+                </a:ext>
+              </a:extLst>
+            </p:cNvPr>
+            <p:cNvCxnSpPr>
+              <a:cxnSpLocks/>
+            </p:cNvCxnSpPr>
+            <p:nvPr/>
+          </p:nvCxnSpPr>
+          <p:spPr>
+            <a:xfrm rot="18960000" flipH="1">
+              <a:off x="7318475" y="3551557"/>
+              <a:ext cx="518346" cy="531144"/>
+            </a:xfrm>
+            <a:prstGeom prst="line">
+              <a:avLst/>
+            </a:prstGeom>
+            <a:ln w="44450">
+              <a:solidFill>
+                <a:schemeClr val="tx1"/>
+              </a:solidFill>
+              <a:round/>
+              <a:headEnd type="oval" w="med" len="med"/>
+              <a:tailEnd type="oval" w="med" len="med"/>
+            </a:ln>
+          </p:spPr>
+          <p:style>
+            <a:lnRef idx="1">
+              <a:schemeClr val="accent1"/>
+            </a:lnRef>
+            <a:fillRef idx="0">
+              <a:schemeClr val="accent1"/>
+            </a:fillRef>
+            <a:effectRef idx="0">
+              <a:schemeClr val="accent1"/>
+            </a:effectRef>
+            <a:fontRef idx="minor">
+              <a:schemeClr val="tx1"/>
+            </a:fontRef>
+          </p:style>
+        </p:cxnSp>
+        <p:sp>
+          <p:nvSpPr>
+            <p:cNvPr id="24" name="Triangle 23">
+              <a:extLst>
+                <a:ext uri="{FF2B5EF4-FFF2-40B4-BE49-F238E27FC236}">
+                  <a16:creationId xmlns:a16="http://schemas.microsoft.com/office/drawing/2014/main" id="{D6CBA9A0-104C-E54A-875C-3235995D8A27}"/>
+                </a:ext>
+              </a:extLst>
+            </p:cNvPr>
+            <p:cNvSpPr>
+              <a:spLocks/>
+            </p:cNvSpPr>
+            <p:nvPr/>
+          </p:nvSpPr>
+          <p:spPr>
+            <a:xfrm rot="8760000" flipH="1">
+              <a:off x="7508521" y="4181756"/>
+              <a:ext cx="151271" cy="204778"/>
+            </a:xfrm>
+            <a:prstGeom prst="triangle">
+              <a:avLst/>
+            </a:prstGeom>
+            <a:solidFill>
+              <a:schemeClr val="bg1">
+                <a:lumMod val="95000"/>
+              </a:schemeClr>
+            </a:solidFill>
+            <a:ln w="44450">
+              <a:solidFill>
+                <a:schemeClr val="tx1"/>
+              </a:solidFill>
+              <a:round/>
+            </a:ln>
+          </p:spPr>
+          <p:style>
+            <a:lnRef idx="2">
+              <a:schemeClr val="accent1">
+                <a:shade val="50000"/>
+              </a:schemeClr>
+            </a:lnRef>
+            <a:fillRef idx="1">
+              <a:schemeClr val="accent1"/>
+            </a:fillRef>
+            <a:effectRef idx="0">
+              <a:schemeClr val="accent1"/>
+            </a:effectRef>
+            <a:fontRef idx="minor">
+              <a:schemeClr val="lt1"/>
+            </a:fontRef>
+          </p:style>
+          <p:txBody>
+            <a:bodyPr rtlCol="0" anchor="ctr"/>
+            <a:lstStyle/>
+            <a:p>
+              <a:pPr algn="ctr"/>
+              <a:endParaRPr lang="en-RS"/>
+            </a:p>
+          </p:txBody>
+        </p:sp>
+        <p:grpSp>
+          <p:nvGrpSpPr>
+            <p:cNvPr id="27" name="Group 26">
+              <a:extLst>
+                <a:ext uri="{FF2B5EF4-FFF2-40B4-BE49-F238E27FC236}">
+                  <a16:creationId xmlns:a16="http://schemas.microsoft.com/office/drawing/2014/main" id="{E94F63DD-0A10-074C-B0D8-3EF3C3CAA8D9}"/>
+                </a:ext>
+              </a:extLst>
+            </p:cNvPr>
+            <p:cNvGrpSpPr/>
             <p:nvPr/>
           </p:nvGrpSpPr>
           <p:grpSpPr>
             <a:xfrm>
-              <a:off x="4473475" y="1869228"/>
-              <a:ext cx="2940289" cy="3536849"/>
-              <a:chOff x="4925531" y="2219219"/>
-              <a:chExt cx="2649331" cy="3186858"/>
+              <a:off x="3922331" y="3642723"/>
+              <a:ext cx="602337" cy="408752"/>
+              <a:chOff x="1634761" y="4134434"/>
+              <a:chExt cx="761663" cy="516873"/>
             </a:xfrm>
           </p:grpSpPr>
-          <p:sp>
-            <p:nvSpPr>
-              <p:cNvPr id="8" name="Oval 7">
+          <p:cxnSp>
+            <p:nvCxnSpPr>
+              <p:cNvPr id="28" name="Straight Connector 27">
                 <a:extLst>
                   <a:ext uri="{FF2B5EF4-FFF2-40B4-BE49-F238E27FC236}">
-                    <a16:creationId xmlns:a16="http://schemas.microsoft.com/office/drawing/2014/main" id="{5232829B-4FE4-874F-AD3E-F7B516B74F3A}"/>
+                    <a16:creationId xmlns:a16="http://schemas.microsoft.com/office/drawing/2014/main" id="{DBEA6B19-92BC-CA4F-BDD9-9B92A98A954B}"/>
                   </a:ext>
                 </a:extLst>
               </p:cNvPr>
-              <p:cNvSpPr>
-                <a:spLocks/>
-              </p:cNvSpPr>
-              <p:nvPr/>
-            </p:nvSpPr>
-            <p:spPr>
-              <a:xfrm>
-                <a:off x="5511508" y="3933996"/>
-                <a:ext cx="256522" cy="256522"/>
-              </a:xfrm>
-              <a:prstGeom prst="ellipse">
-                <a:avLst/>
-              </a:prstGeom>
-              <a:solidFill>
-                <a:schemeClr val="bg1">
-                  <a:lumMod val="85000"/>
-                </a:schemeClr>
-              </a:solidFill>
-              <a:ln>
-                <a:solidFill>
-                  <a:schemeClr val="tx1"/>
-                </a:solidFill>
-              </a:ln>
-            </p:spPr>
-            <p:style>
-              <a:lnRef idx="2">
-                <a:schemeClr val="accent1">
-                  <a:shade val="50000"/>
-                </a:schemeClr>
-              </a:lnRef>
-              <a:fillRef idx="1">
-                <a:schemeClr val="accent1"/>
-              </a:fillRef>
-              <a:effectRef idx="0">
-                <a:schemeClr val="accent1"/>
-              </a:effectRef>
-              <a:fontRef idx="minor">
-                <a:schemeClr val="lt1"/>
-              </a:fontRef>
-            </p:style>
-            <p:txBody>
-              <a:bodyPr rtlCol="0" anchor="ctr"/>
-              <a:lstStyle/>
-              <a:p>
-                <a:pPr algn="ctr"/>
-                <a:endParaRPr lang="en-RS"/>
-              </a:p>
-            </p:txBody>
-          </p:sp>
-          <p:cxnSp>
-            <p:nvCxnSpPr>
-              <p:cNvPr id="9" name="Straight Connector 8">
-                <a:extLst>
-                  <a:ext uri="{FF2B5EF4-FFF2-40B4-BE49-F238E27FC236}">
-                    <a16:creationId xmlns:a16="http://schemas.microsoft.com/office/drawing/2014/main" id="{A7C3E16D-AFB1-8141-A9B7-DF25ACA4C6DA}"/>
-                  </a:ext>
-                </a:extLst>
-              </p:cNvPr>
-              <p:cNvCxnSpPr>
-                <a:cxnSpLocks/>
-                <a:stCxn id="8" idx="3"/>
-              </p:cNvCxnSpPr>
+              <p:cNvCxnSpPr/>
               <p:nvPr/>
             </p:nvCxnSpPr>
             <p:spPr>
               <a:xfrm flipH="1">
-                <a:off x="5130946" y="4152951"/>
-                <a:ext cx="418129" cy="594062"/>
+                <a:off x="1634761" y="4134434"/>
+                <a:ext cx="761663" cy="123825"/>
               </a:xfrm>
               <a:prstGeom prst="line">
                 <a:avLst/>
               </a:prstGeom>
-              <a:ln w="12700">
+              <a:ln w="44450">
                 <a:solidFill>
                   <a:schemeClr val="tx1"/>
                 </a:solidFill>
+                <a:round/>
                 <a:headEnd type="oval" w="med" len="med"/>
                 <a:tailEnd type="oval" w="med" len="med"/>
               </a:ln>
@@ -3834,10 +4505,10 @@
           </p:cxnSp>
           <p:cxnSp>
             <p:nvCxnSpPr>
-              <p:cNvPr id="10" name="Straight Connector 9">
+              <p:cNvPr id="29" name="Straight Connector 28">
                 <a:extLst>
                   <a:ext uri="{FF2B5EF4-FFF2-40B4-BE49-F238E27FC236}">
-                    <a16:creationId xmlns:a16="http://schemas.microsoft.com/office/drawing/2014/main" id="{4C78EF6A-DEA4-CC40-B42A-86277E9A9A69}"/>
+                    <a16:creationId xmlns:a16="http://schemas.microsoft.com/office/drawing/2014/main" id="{D411427B-8DF4-8149-87F0-1746D009235B}"/>
                   </a:ext>
                 </a:extLst>
               </p:cNvPr>
@@ -3847,17 +4518,83 @@
               <p:nvPr/>
             </p:nvCxnSpPr>
             <p:spPr>
-              <a:xfrm flipH="1">
-                <a:off x="5130946" y="4747013"/>
-                <a:ext cx="542012" cy="0"/>
+              <a:xfrm>
+                <a:off x="1634762" y="4258259"/>
+                <a:ext cx="380830" cy="393048"/>
               </a:xfrm>
               <a:prstGeom prst="line">
                 <a:avLst/>
               </a:prstGeom>
-              <a:ln w="12700">
+              <a:ln w="44450">
                 <a:solidFill>
                   <a:schemeClr val="tx1"/>
                 </a:solidFill>
+                <a:round/>
+                <a:headEnd type="oval" w="med" len="med"/>
+                <a:tailEnd type="oval" w="med" len="med"/>
+              </a:ln>
+            </p:spPr>
+            <p:style>
+              <a:lnRef idx="1">
+                <a:schemeClr val="accent1"/>
+              </a:lnRef>
+              <a:fillRef idx="0">
+                <a:schemeClr val="accent1"/>
+              </a:fillRef>
+              <a:effectRef idx="0">
+                <a:schemeClr val="accent1"/>
+              </a:effectRef>
+              <a:fontRef idx="minor">
+                <a:schemeClr val="tx1"/>
+              </a:fontRef>
+            </p:style>
+          </p:cxnSp>
+        </p:grpSp>
+        <p:grpSp>
+          <p:nvGrpSpPr>
+            <p:cNvPr id="30" name="Group 29">
+              <a:extLst>
+                <a:ext uri="{FF2B5EF4-FFF2-40B4-BE49-F238E27FC236}">
+                  <a16:creationId xmlns:a16="http://schemas.microsoft.com/office/drawing/2014/main" id="{F1746FB6-7C6B-054A-A7BC-04F49966A136}"/>
+                </a:ext>
+              </a:extLst>
+            </p:cNvPr>
+            <p:cNvGrpSpPr/>
+            <p:nvPr/>
+          </p:nvGrpSpPr>
+          <p:grpSpPr>
+            <a:xfrm rot="19534479">
+              <a:off x="5610010" y="2850456"/>
+              <a:ext cx="602337" cy="408752"/>
+              <a:chOff x="1634761" y="4134434"/>
+              <a:chExt cx="761663" cy="516873"/>
+            </a:xfrm>
+          </p:grpSpPr>
+          <p:cxnSp>
+            <p:nvCxnSpPr>
+              <p:cNvPr id="31" name="Straight Connector 30">
+                <a:extLst>
+                  <a:ext uri="{FF2B5EF4-FFF2-40B4-BE49-F238E27FC236}">
+                    <a16:creationId xmlns:a16="http://schemas.microsoft.com/office/drawing/2014/main" id="{065A7E36-BE69-A447-A61C-C41B574E2586}"/>
+                  </a:ext>
+                </a:extLst>
+              </p:cNvPr>
+              <p:cNvCxnSpPr/>
+              <p:nvPr/>
+            </p:nvCxnSpPr>
+            <p:spPr>
+              <a:xfrm flipH="1">
+                <a:off x="1634761" y="4134434"/>
+                <a:ext cx="761663" cy="123825"/>
+              </a:xfrm>
+              <a:prstGeom prst="line">
+                <a:avLst/>
+              </a:prstGeom>
+              <a:ln w="44450">
+                <a:solidFill>
+                  <a:schemeClr val="tx1"/>
+                </a:solidFill>
+                <a:round/>
                 <a:headEnd type="oval" w="med" len="med"/>
                 <a:tailEnd type="oval" w="med" len="med"/>
               </a:ln>
@@ -3879,10 +4616,10 @@
           </p:cxnSp>
           <p:cxnSp>
             <p:nvCxnSpPr>
-              <p:cNvPr id="11" name="Straight Connector 10">
+              <p:cNvPr id="32" name="Straight Connector 31">
                 <a:extLst>
                   <a:ext uri="{FF2B5EF4-FFF2-40B4-BE49-F238E27FC236}">
-                    <a16:creationId xmlns:a16="http://schemas.microsoft.com/office/drawing/2014/main" id="{BBB32599-FB6A-BC46-B045-50D357431772}"/>
+                    <a16:creationId xmlns:a16="http://schemas.microsoft.com/office/drawing/2014/main" id="{11B4E20C-EE40-F149-A139-AAAB22ED66A7}"/>
                   </a:ext>
                 </a:extLst>
               </p:cNvPr>
@@ -3892,17 +4629,18 @@
               <p:nvPr/>
             </p:nvCxnSpPr>
             <p:spPr>
-              <a:xfrm flipH="1">
-                <a:off x="5205905" y="4747013"/>
-                <a:ext cx="467053" cy="478584"/>
+              <a:xfrm>
+                <a:off x="1634762" y="4258259"/>
+                <a:ext cx="380830" cy="393048"/>
               </a:xfrm>
               <a:prstGeom prst="line">
                 <a:avLst/>
               </a:prstGeom>
-              <a:ln w="12700">
+              <a:ln w="44450">
                 <a:solidFill>
                   <a:schemeClr val="tx1"/>
                 </a:solidFill>
+                <a:round/>
                 <a:headEnd type="oval" w="med" len="med"/>
                 <a:tailEnd type="oval" w="med" len="med"/>
               </a:ln>
@@ -3922,207 +4660,52 @@
               </a:fontRef>
             </p:style>
           </p:cxnSp>
-          <p:sp>
-            <p:nvSpPr>
-              <p:cNvPr id="12" name="Triangle 11">
+        </p:grpSp>
+        <p:grpSp>
+          <p:nvGrpSpPr>
+            <p:cNvPr id="33" name="Group 32">
+              <a:extLst>
+                <a:ext uri="{FF2B5EF4-FFF2-40B4-BE49-F238E27FC236}">
+                  <a16:creationId xmlns:a16="http://schemas.microsoft.com/office/drawing/2014/main" id="{8BEDD7CC-474C-9E46-8B9E-86D9A5DA8307}"/>
+                </a:ext>
+              </a:extLst>
+            </p:cNvPr>
+            <p:cNvGrpSpPr/>
+            <p:nvPr/>
+          </p:nvGrpSpPr>
+          <p:grpSpPr>
+            <a:xfrm rot="19534479">
+              <a:off x="7163027" y="2316246"/>
+              <a:ext cx="602337" cy="408752"/>
+              <a:chOff x="1634761" y="4134434"/>
+              <a:chExt cx="761663" cy="516873"/>
+            </a:xfrm>
+          </p:grpSpPr>
+          <p:cxnSp>
+            <p:nvCxnSpPr>
+              <p:cNvPr id="34" name="Straight Connector 33">
                 <a:extLst>
                   <a:ext uri="{FF2B5EF4-FFF2-40B4-BE49-F238E27FC236}">
-                    <a16:creationId xmlns:a16="http://schemas.microsoft.com/office/drawing/2014/main" id="{A7E2B55F-B1E1-0448-BA8C-7E22E6AD7025}"/>
+                    <a16:creationId xmlns:a16="http://schemas.microsoft.com/office/drawing/2014/main" id="{19AB7001-A8FD-4445-99F9-30AD5EDFCC7F}"/>
                   </a:ext>
                 </a:extLst>
               </p:cNvPr>
-              <p:cNvSpPr>
-                <a:spLocks/>
-              </p:cNvSpPr>
-              <p:nvPr/>
-            </p:nvSpPr>
-            <p:spPr>
-              <a:xfrm rot="7485185" flipH="1">
-                <a:off x="5177444" y="5241925"/>
-                <a:ext cx="136302" cy="184514"/>
-              </a:xfrm>
-              <a:prstGeom prst="triangle">
-                <a:avLst/>
-              </a:prstGeom>
-              <a:solidFill>
-                <a:schemeClr val="bg1">
-                  <a:lumMod val="95000"/>
-                </a:schemeClr>
-              </a:solidFill>
-              <a:ln>
-                <a:solidFill>
-                  <a:schemeClr val="tx1"/>
-                </a:solidFill>
-              </a:ln>
-            </p:spPr>
-            <p:style>
-              <a:lnRef idx="2">
-                <a:schemeClr val="accent1">
-                  <a:shade val="50000"/>
-                </a:schemeClr>
-              </a:lnRef>
-              <a:fillRef idx="1">
-                <a:schemeClr val="accent1"/>
-              </a:fillRef>
-              <a:effectRef idx="0">
-                <a:schemeClr val="accent1"/>
-              </a:effectRef>
-              <a:fontRef idx="minor">
-                <a:schemeClr val="lt1"/>
-              </a:fontRef>
-            </p:style>
-            <p:txBody>
-              <a:bodyPr rtlCol="0" anchor="ctr"/>
-              <a:lstStyle/>
-              <a:p>
-                <a:pPr algn="ctr"/>
-                <a:endParaRPr lang="en-RS"/>
-              </a:p>
-            </p:txBody>
-          </p:sp>
-          <p:sp>
-            <p:nvSpPr>
-              <p:cNvPr id="13" name="Oval 12">
-                <a:extLst>
-                  <a:ext uri="{FF2B5EF4-FFF2-40B4-BE49-F238E27FC236}">
-                    <a16:creationId xmlns:a16="http://schemas.microsoft.com/office/drawing/2014/main" id="{1348657D-9A75-9047-9B2B-85C015030E92}"/>
-                  </a:ext>
-                </a:extLst>
-              </p:cNvPr>
-              <p:cNvSpPr>
-                <a:spLocks/>
-              </p:cNvSpPr>
-              <p:nvPr/>
-            </p:nvSpPr>
-            <p:spPr>
-              <a:xfrm>
-                <a:off x="5275880" y="4559684"/>
-                <a:ext cx="128261" cy="128261"/>
-              </a:xfrm>
-              <a:prstGeom prst="ellipse">
-                <a:avLst/>
-              </a:prstGeom>
-              <a:solidFill>
-                <a:schemeClr val="tx1"/>
-              </a:solidFill>
-              <a:ln>
-                <a:solidFill>
-                  <a:schemeClr val="tx1"/>
-                </a:solidFill>
-              </a:ln>
-            </p:spPr>
-            <p:style>
-              <a:lnRef idx="2">
-                <a:schemeClr val="accent1">
-                  <a:shade val="50000"/>
-                </a:schemeClr>
-              </a:lnRef>
-              <a:fillRef idx="1">
-                <a:schemeClr val="accent1"/>
-              </a:fillRef>
-              <a:effectRef idx="0">
-                <a:schemeClr val="accent1"/>
-              </a:effectRef>
-              <a:fontRef idx="minor">
-                <a:schemeClr val="lt1"/>
-              </a:fontRef>
-            </p:style>
-            <p:txBody>
-              <a:bodyPr rtlCol="0" anchor="ctr"/>
-              <a:lstStyle/>
-              <a:p>
-                <a:pPr algn="ctr"/>
-                <a:r>
-                  <a:rPr lang="en-RS" dirty="0"/>
-                  <a:t>X</a:t>
-                </a:r>
-              </a:p>
-            </p:txBody>
-          </p:sp>
-          <p:sp>
-            <p:nvSpPr>
-              <p:cNvPr id="14" name="Oval 13">
-                <a:extLst>
-                  <a:ext uri="{FF2B5EF4-FFF2-40B4-BE49-F238E27FC236}">
-                    <a16:creationId xmlns:a16="http://schemas.microsoft.com/office/drawing/2014/main" id="{03B4165E-1977-8D4A-877F-D2628193B194}"/>
-                  </a:ext>
-                </a:extLst>
-              </p:cNvPr>
-              <p:cNvSpPr>
-                <a:spLocks/>
-              </p:cNvSpPr>
-              <p:nvPr/>
-            </p:nvSpPr>
-            <p:spPr>
-              <a:xfrm>
-                <a:off x="6324356" y="3022959"/>
-                <a:ext cx="256522" cy="256522"/>
-              </a:xfrm>
-              <a:prstGeom prst="ellipse">
-                <a:avLst/>
-              </a:prstGeom>
-              <a:solidFill>
-                <a:schemeClr val="bg1">
-                  <a:lumMod val="85000"/>
-                </a:schemeClr>
-              </a:solidFill>
-              <a:ln>
-                <a:solidFill>
-                  <a:schemeClr val="tx1"/>
-                </a:solidFill>
-              </a:ln>
-            </p:spPr>
-            <p:style>
-              <a:lnRef idx="2">
-                <a:schemeClr val="accent1">
-                  <a:shade val="50000"/>
-                </a:schemeClr>
-              </a:lnRef>
-              <a:fillRef idx="1">
-                <a:schemeClr val="accent1"/>
-              </a:fillRef>
-              <a:effectRef idx="0">
-                <a:schemeClr val="accent1"/>
-              </a:effectRef>
-              <a:fontRef idx="minor">
-                <a:schemeClr val="lt1"/>
-              </a:fontRef>
-            </p:style>
-            <p:txBody>
-              <a:bodyPr rtlCol="0" anchor="ctr"/>
-              <a:lstStyle/>
-              <a:p>
-                <a:pPr algn="ctr"/>
-                <a:endParaRPr lang="en-RS"/>
-              </a:p>
-            </p:txBody>
-          </p:sp>
-          <p:cxnSp>
-            <p:nvCxnSpPr>
-              <p:cNvPr id="15" name="Straight Connector 14">
-                <a:extLst>
-                  <a:ext uri="{FF2B5EF4-FFF2-40B4-BE49-F238E27FC236}">
-                    <a16:creationId xmlns:a16="http://schemas.microsoft.com/office/drawing/2014/main" id="{3B89A510-C576-3A40-86D2-78F432992629}"/>
-                  </a:ext>
-                </a:extLst>
-              </p:cNvPr>
-              <p:cNvCxnSpPr>
-                <a:cxnSpLocks/>
-              </p:cNvCxnSpPr>
+              <p:cNvCxnSpPr/>
               <p:nvPr/>
             </p:nvCxnSpPr>
             <p:spPr>
-              <a:xfrm rot="19560000" flipH="1">
-                <a:off x="6234898" y="3355278"/>
-                <a:ext cx="418129" cy="594061"/>
+              <a:xfrm flipH="1">
+                <a:off x="1634761" y="4134434"/>
+                <a:ext cx="761663" cy="123825"/>
               </a:xfrm>
               <a:prstGeom prst="line">
                 <a:avLst/>
               </a:prstGeom>
-              <a:ln w="12700">
+              <a:ln w="44450">
                 <a:solidFill>
                   <a:schemeClr val="tx1"/>
                 </a:solidFill>
+                <a:round/>
                 <a:headEnd type="oval" w="med" len="med"/>
                 <a:tailEnd type="oval" w="med" len="med"/>
               </a:ln>
@@ -4144,10 +4727,10 @@
           </p:cxnSp>
           <p:cxnSp>
             <p:nvCxnSpPr>
-              <p:cNvPr id="16" name="Straight Connector 15">
+              <p:cNvPr id="35" name="Straight Connector 34">
                 <a:extLst>
                   <a:ext uri="{FF2B5EF4-FFF2-40B4-BE49-F238E27FC236}">
-                    <a16:creationId xmlns:a16="http://schemas.microsoft.com/office/drawing/2014/main" id="{5C491683-1688-694B-8334-9CF4E5116BEA}"/>
+                    <a16:creationId xmlns:a16="http://schemas.microsoft.com/office/drawing/2014/main" id="{46A4B3A7-CF72-1843-911C-B2B64E3AC867}"/>
                   </a:ext>
                 </a:extLst>
               </p:cNvPr>
@@ -4157,17 +4740,18 @@
               <p:nvPr/>
             </p:nvCxnSpPr>
             <p:spPr>
-              <a:xfrm rot="5460000" flipH="1">
-                <a:off x="6161439" y="4285621"/>
-                <a:ext cx="542012" cy="0"/>
+              <a:xfrm>
+                <a:off x="1634762" y="4258259"/>
+                <a:ext cx="380830" cy="393048"/>
               </a:xfrm>
               <a:prstGeom prst="line">
                 <a:avLst/>
               </a:prstGeom>
-              <a:ln w="12700">
+              <a:ln w="44450">
                 <a:solidFill>
                   <a:schemeClr val="tx1"/>
                 </a:solidFill>
+                <a:round/>
                 <a:headEnd type="oval" w="med" len="med"/>
                 <a:tailEnd type="oval" w="med" len="med"/>
               </a:ln>
@@ -4187,805 +4771,6 @@
               </a:fontRef>
             </p:style>
           </p:cxnSp>
-          <p:cxnSp>
-            <p:nvCxnSpPr>
-              <p:cNvPr id="17" name="Straight Connector 16">
-                <a:extLst>
-                  <a:ext uri="{FF2B5EF4-FFF2-40B4-BE49-F238E27FC236}">
-                    <a16:creationId xmlns:a16="http://schemas.microsoft.com/office/drawing/2014/main" id="{3AB958A5-A873-F34A-ADE7-E9403341E93D}"/>
-                  </a:ext>
-                </a:extLst>
-              </p:cNvPr>
-              <p:cNvCxnSpPr>
-                <a:cxnSpLocks/>
-              </p:cNvCxnSpPr>
-              <p:nvPr/>
-            </p:nvCxnSpPr>
-            <p:spPr>
-              <a:xfrm rot="18960000" flipH="1">
-                <a:off x="6193055" y="4653726"/>
-                <a:ext cx="467053" cy="478584"/>
-              </a:xfrm>
-              <a:prstGeom prst="line">
-                <a:avLst/>
-              </a:prstGeom>
-              <a:ln w="12700">
-                <a:solidFill>
-                  <a:schemeClr val="tx1"/>
-                </a:solidFill>
-                <a:headEnd type="oval" w="med" len="med"/>
-                <a:tailEnd type="oval" w="med" len="med"/>
-              </a:ln>
-            </p:spPr>
-            <p:style>
-              <a:lnRef idx="1">
-                <a:schemeClr val="accent1"/>
-              </a:lnRef>
-              <a:fillRef idx="0">
-                <a:schemeClr val="accent1"/>
-              </a:fillRef>
-              <a:effectRef idx="0">
-                <a:schemeClr val="accent1"/>
-              </a:effectRef>
-              <a:fontRef idx="minor">
-                <a:schemeClr val="tx1"/>
-              </a:fontRef>
-            </p:style>
-          </p:cxnSp>
-          <p:sp>
-            <p:nvSpPr>
-              <p:cNvPr id="18" name="Triangle 17">
-                <a:extLst>
-                  <a:ext uri="{FF2B5EF4-FFF2-40B4-BE49-F238E27FC236}">
-                    <a16:creationId xmlns:a16="http://schemas.microsoft.com/office/drawing/2014/main" id="{83B23A44-63A4-DE4E-B0AF-FA567DA33779}"/>
-                  </a:ext>
-                </a:extLst>
-              </p:cNvPr>
-              <p:cNvSpPr>
-                <a:spLocks/>
-              </p:cNvSpPr>
-              <p:nvPr/>
-            </p:nvSpPr>
-            <p:spPr>
-              <a:xfrm rot="8760000" flipH="1">
-                <a:off x="6364295" y="5221563"/>
-                <a:ext cx="136302" cy="184514"/>
-              </a:xfrm>
-              <a:prstGeom prst="triangle">
-                <a:avLst/>
-              </a:prstGeom>
-              <a:solidFill>
-                <a:schemeClr val="bg1">
-                  <a:lumMod val="95000"/>
-                </a:schemeClr>
-              </a:solidFill>
-              <a:ln>
-                <a:solidFill>
-                  <a:schemeClr val="tx1"/>
-                </a:solidFill>
-              </a:ln>
-            </p:spPr>
-            <p:style>
-              <a:lnRef idx="2">
-                <a:schemeClr val="accent1">
-                  <a:shade val="50000"/>
-                </a:schemeClr>
-              </a:lnRef>
-              <a:fillRef idx="1">
-                <a:schemeClr val="accent1"/>
-              </a:fillRef>
-              <a:effectRef idx="0">
-                <a:schemeClr val="accent1"/>
-              </a:effectRef>
-              <a:fontRef idx="minor">
-                <a:schemeClr val="lt1"/>
-              </a:fontRef>
-            </p:style>
-            <p:txBody>
-              <a:bodyPr rtlCol="0" anchor="ctr"/>
-              <a:lstStyle/>
-              <a:p>
-                <a:pPr algn="ctr"/>
-                <a:endParaRPr lang="en-RS"/>
-              </a:p>
-            </p:txBody>
-          </p:sp>
-          <p:sp>
-            <p:nvSpPr>
-              <p:cNvPr id="19" name="Oval 18">
-                <a:extLst>
-                  <a:ext uri="{FF2B5EF4-FFF2-40B4-BE49-F238E27FC236}">
-                    <a16:creationId xmlns:a16="http://schemas.microsoft.com/office/drawing/2014/main" id="{E560CBEF-EA24-0A49-BCA2-0CA0DD7442CA}"/>
-                  </a:ext>
-                </a:extLst>
-              </p:cNvPr>
-              <p:cNvSpPr>
-                <a:spLocks/>
-              </p:cNvSpPr>
-              <p:nvPr/>
-            </p:nvSpPr>
-            <p:spPr>
-              <a:xfrm>
-                <a:off x="6368314" y="3953414"/>
-                <a:ext cx="128261" cy="128261"/>
-              </a:xfrm>
-              <a:prstGeom prst="ellipse">
-                <a:avLst/>
-              </a:prstGeom>
-              <a:solidFill>
-                <a:schemeClr val="tx1"/>
-              </a:solidFill>
-              <a:ln>
-                <a:solidFill>
-                  <a:schemeClr val="tx1"/>
-                </a:solidFill>
-              </a:ln>
-            </p:spPr>
-            <p:style>
-              <a:lnRef idx="2">
-                <a:schemeClr val="accent1">
-                  <a:shade val="50000"/>
-                </a:schemeClr>
-              </a:lnRef>
-              <a:fillRef idx="1">
-                <a:schemeClr val="accent1"/>
-              </a:fillRef>
-              <a:effectRef idx="0">
-                <a:schemeClr val="accent1"/>
-              </a:effectRef>
-              <a:fontRef idx="minor">
-                <a:schemeClr val="lt1"/>
-              </a:fontRef>
-            </p:style>
-            <p:txBody>
-              <a:bodyPr rtlCol="0" anchor="ctr"/>
-              <a:lstStyle/>
-              <a:p>
-                <a:pPr algn="ctr"/>
-                <a:r>
-                  <a:rPr lang="en-RS" dirty="0"/>
-                  <a:t>X</a:t>
-                </a:r>
-              </a:p>
-            </p:txBody>
-          </p:sp>
-          <p:sp>
-            <p:nvSpPr>
-              <p:cNvPr id="20" name="Oval 19">
-                <a:extLst>
-                  <a:ext uri="{FF2B5EF4-FFF2-40B4-BE49-F238E27FC236}">
-                    <a16:creationId xmlns:a16="http://schemas.microsoft.com/office/drawing/2014/main" id="{40BFDE82-F932-FC4A-A633-2BBF515AF604}"/>
-                  </a:ext>
-                </a:extLst>
-              </p:cNvPr>
-              <p:cNvSpPr>
-                <a:spLocks/>
-              </p:cNvSpPr>
-              <p:nvPr/>
-            </p:nvSpPr>
-            <p:spPr>
-              <a:xfrm>
-                <a:off x="7239110" y="2219219"/>
-                <a:ext cx="256522" cy="256522"/>
-              </a:xfrm>
-              <a:prstGeom prst="ellipse">
-                <a:avLst/>
-              </a:prstGeom>
-              <a:solidFill>
-                <a:schemeClr val="bg1">
-                  <a:lumMod val="85000"/>
-                </a:schemeClr>
-              </a:solidFill>
-              <a:ln>
-                <a:solidFill>
-                  <a:schemeClr val="tx1"/>
-                </a:solidFill>
-              </a:ln>
-            </p:spPr>
-            <p:style>
-              <a:lnRef idx="2">
-                <a:schemeClr val="accent1">
-                  <a:shade val="50000"/>
-                </a:schemeClr>
-              </a:lnRef>
-              <a:fillRef idx="1">
-                <a:schemeClr val="accent1"/>
-              </a:fillRef>
-              <a:effectRef idx="0">
-                <a:schemeClr val="accent1"/>
-              </a:effectRef>
-              <a:fontRef idx="minor">
-                <a:schemeClr val="lt1"/>
-              </a:fontRef>
-            </p:style>
-            <p:txBody>
-              <a:bodyPr rtlCol="0" anchor="ctr"/>
-              <a:lstStyle/>
-              <a:p>
-                <a:pPr algn="ctr"/>
-                <a:endParaRPr lang="en-RS"/>
-              </a:p>
-            </p:txBody>
-          </p:sp>
-          <p:cxnSp>
-            <p:nvCxnSpPr>
-              <p:cNvPr id="21" name="Straight Connector 20">
-                <a:extLst>
-                  <a:ext uri="{FF2B5EF4-FFF2-40B4-BE49-F238E27FC236}">
-                    <a16:creationId xmlns:a16="http://schemas.microsoft.com/office/drawing/2014/main" id="{D67152B3-FA31-BC48-B8C0-D85A9DBFA312}"/>
-                  </a:ext>
-                </a:extLst>
-              </p:cNvPr>
-              <p:cNvCxnSpPr>
-                <a:cxnSpLocks/>
-              </p:cNvCxnSpPr>
-              <p:nvPr/>
-            </p:nvCxnSpPr>
-            <p:spPr>
-              <a:xfrm rot="19560000" flipH="1">
-                <a:off x="7149652" y="2551539"/>
-                <a:ext cx="418129" cy="594061"/>
-              </a:xfrm>
-              <a:prstGeom prst="line">
-                <a:avLst/>
-              </a:prstGeom>
-              <a:ln w="12700">
-                <a:solidFill>
-                  <a:schemeClr val="tx1"/>
-                </a:solidFill>
-                <a:headEnd type="oval" w="med" len="med"/>
-                <a:tailEnd type="oval" w="med" len="med"/>
-              </a:ln>
-            </p:spPr>
-            <p:style>
-              <a:lnRef idx="1">
-                <a:schemeClr val="accent1"/>
-              </a:lnRef>
-              <a:fillRef idx="0">
-                <a:schemeClr val="accent1"/>
-              </a:fillRef>
-              <a:effectRef idx="0">
-                <a:schemeClr val="accent1"/>
-              </a:effectRef>
-              <a:fontRef idx="minor">
-                <a:schemeClr val="tx1"/>
-              </a:fontRef>
-            </p:style>
-          </p:cxnSp>
-          <p:cxnSp>
-            <p:nvCxnSpPr>
-              <p:cNvPr id="22" name="Straight Connector 21">
-                <a:extLst>
-                  <a:ext uri="{FF2B5EF4-FFF2-40B4-BE49-F238E27FC236}">
-                    <a16:creationId xmlns:a16="http://schemas.microsoft.com/office/drawing/2014/main" id="{6A7CA33A-AC14-7C4A-A3A6-DDE88ED94C1F}"/>
-                  </a:ext>
-                </a:extLst>
-              </p:cNvPr>
-              <p:cNvCxnSpPr>
-                <a:cxnSpLocks/>
-              </p:cNvCxnSpPr>
-              <p:nvPr/>
-            </p:nvCxnSpPr>
-            <p:spPr>
-              <a:xfrm rot="5460000" flipH="1">
-                <a:off x="7076193" y="3481881"/>
-                <a:ext cx="542012" cy="0"/>
-              </a:xfrm>
-              <a:prstGeom prst="line">
-                <a:avLst/>
-              </a:prstGeom>
-              <a:ln w="12700">
-                <a:solidFill>
-                  <a:schemeClr val="tx1"/>
-                </a:solidFill>
-                <a:headEnd type="oval" w="med" len="med"/>
-                <a:tailEnd type="oval" w="med" len="med"/>
-              </a:ln>
-            </p:spPr>
-            <p:style>
-              <a:lnRef idx="1">
-                <a:schemeClr val="accent1"/>
-              </a:lnRef>
-              <a:fillRef idx="0">
-                <a:schemeClr val="accent1"/>
-              </a:fillRef>
-              <a:effectRef idx="0">
-                <a:schemeClr val="accent1"/>
-              </a:effectRef>
-              <a:fontRef idx="minor">
-                <a:schemeClr val="tx1"/>
-              </a:fontRef>
-            </p:style>
-          </p:cxnSp>
-          <p:cxnSp>
-            <p:nvCxnSpPr>
-              <p:cNvPr id="23" name="Straight Connector 22">
-                <a:extLst>
-                  <a:ext uri="{FF2B5EF4-FFF2-40B4-BE49-F238E27FC236}">
-                    <a16:creationId xmlns:a16="http://schemas.microsoft.com/office/drawing/2014/main" id="{2586C563-ED7D-8940-B52D-EC42A220F5D1}"/>
-                  </a:ext>
-                </a:extLst>
-              </p:cNvPr>
-              <p:cNvCxnSpPr>
-                <a:cxnSpLocks/>
-              </p:cNvCxnSpPr>
-              <p:nvPr/>
-            </p:nvCxnSpPr>
-            <p:spPr>
-              <a:xfrm rot="18960000" flipH="1">
-                <a:off x="7107809" y="3849987"/>
-                <a:ext cx="467053" cy="478584"/>
-              </a:xfrm>
-              <a:prstGeom prst="line">
-                <a:avLst/>
-              </a:prstGeom>
-              <a:ln w="12700">
-                <a:solidFill>
-                  <a:schemeClr val="tx1"/>
-                </a:solidFill>
-                <a:headEnd type="oval" w="med" len="med"/>
-                <a:tailEnd type="oval" w="med" len="med"/>
-              </a:ln>
-            </p:spPr>
-            <p:style>
-              <a:lnRef idx="1">
-                <a:schemeClr val="accent1"/>
-              </a:lnRef>
-              <a:fillRef idx="0">
-                <a:schemeClr val="accent1"/>
-              </a:fillRef>
-              <a:effectRef idx="0">
-                <a:schemeClr val="accent1"/>
-              </a:effectRef>
-              <a:fontRef idx="minor">
-                <a:schemeClr val="tx1"/>
-              </a:fontRef>
-            </p:style>
-          </p:cxnSp>
-          <p:sp>
-            <p:nvSpPr>
-              <p:cNvPr id="24" name="Triangle 23">
-                <a:extLst>
-                  <a:ext uri="{FF2B5EF4-FFF2-40B4-BE49-F238E27FC236}">
-                    <a16:creationId xmlns:a16="http://schemas.microsoft.com/office/drawing/2014/main" id="{D6CBA9A0-104C-E54A-875C-3235995D8A27}"/>
-                  </a:ext>
-                </a:extLst>
-              </p:cNvPr>
-              <p:cNvSpPr>
-                <a:spLocks/>
-              </p:cNvSpPr>
-              <p:nvPr/>
-            </p:nvSpPr>
-            <p:spPr>
-              <a:xfrm rot="8760000" flipH="1">
-                <a:off x="7279049" y="4417824"/>
-                <a:ext cx="136302" cy="184514"/>
-              </a:xfrm>
-              <a:prstGeom prst="triangle">
-                <a:avLst/>
-              </a:prstGeom>
-              <a:solidFill>
-                <a:schemeClr val="bg1">
-                  <a:lumMod val="95000"/>
-                </a:schemeClr>
-              </a:solidFill>
-              <a:ln>
-                <a:solidFill>
-                  <a:schemeClr val="tx1"/>
-                </a:solidFill>
-              </a:ln>
-            </p:spPr>
-            <p:style>
-              <a:lnRef idx="2">
-                <a:schemeClr val="accent1">
-                  <a:shade val="50000"/>
-                </a:schemeClr>
-              </a:lnRef>
-              <a:fillRef idx="1">
-                <a:schemeClr val="accent1"/>
-              </a:fillRef>
-              <a:effectRef idx="0">
-                <a:schemeClr val="accent1"/>
-              </a:effectRef>
-              <a:fontRef idx="minor">
-                <a:schemeClr val="lt1"/>
-              </a:fontRef>
-            </p:style>
-            <p:txBody>
-              <a:bodyPr rtlCol="0" anchor="ctr"/>
-              <a:lstStyle/>
-              <a:p>
-                <a:pPr algn="ctr"/>
-                <a:endParaRPr lang="en-RS"/>
-              </a:p>
-            </p:txBody>
-          </p:sp>
-          <p:sp>
-            <p:nvSpPr>
-              <p:cNvPr id="25" name="Oval 24">
-                <a:extLst>
-                  <a:ext uri="{FF2B5EF4-FFF2-40B4-BE49-F238E27FC236}">
-                    <a16:creationId xmlns:a16="http://schemas.microsoft.com/office/drawing/2014/main" id="{FF71C38A-B209-D943-96B8-9B4D10076882}"/>
-                  </a:ext>
-                </a:extLst>
-              </p:cNvPr>
-              <p:cNvSpPr>
-                <a:spLocks/>
-              </p:cNvSpPr>
-              <p:nvPr/>
-            </p:nvSpPr>
-            <p:spPr>
-              <a:xfrm>
-                <a:off x="7283068" y="3149674"/>
-                <a:ext cx="128261" cy="128261"/>
-              </a:xfrm>
-              <a:prstGeom prst="ellipse">
-                <a:avLst/>
-              </a:prstGeom>
-              <a:solidFill>
-                <a:schemeClr val="tx1"/>
-              </a:solidFill>
-              <a:ln>
-                <a:solidFill>
-                  <a:schemeClr val="tx1"/>
-                </a:solidFill>
-              </a:ln>
-            </p:spPr>
-            <p:style>
-              <a:lnRef idx="2">
-                <a:schemeClr val="accent1">
-                  <a:shade val="50000"/>
-                </a:schemeClr>
-              </a:lnRef>
-              <a:fillRef idx="1">
-                <a:schemeClr val="accent1"/>
-              </a:fillRef>
-              <a:effectRef idx="0">
-                <a:schemeClr val="accent1"/>
-              </a:effectRef>
-              <a:fontRef idx="minor">
-                <a:schemeClr val="lt1"/>
-              </a:fontRef>
-            </p:style>
-            <p:txBody>
-              <a:bodyPr rtlCol="0" anchor="ctr"/>
-              <a:lstStyle/>
-              <a:p>
-                <a:pPr algn="ctr"/>
-                <a:r>
-                  <a:rPr lang="en-RS" dirty="0"/>
-                  <a:t>X</a:t>
-                </a:r>
-              </a:p>
-            </p:txBody>
-          </p:sp>
-          <p:grpSp>
-            <p:nvGrpSpPr>
-              <p:cNvPr id="27" name="Group 26">
-                <a:extLst>
-                  <a:ext uri="{FF2B5EF4-FFF2-40B4-BE49-F238E27FC236}">
-                    <a16:creationId xmlns:a16="http://schemas.microsoft.com/office/drawing/2014/main" id="{E94F63DD-0A10-074C-B0D8-3EF3C3CAA8D9}"/>
-                  </a:ext>
-                </a:extLst>
-              </p:cNvPr>
-              <p:cNvGrpSpPr/>
-              <p:nvPr/>
-            </p:nvGrpSpPr>
-            <p:grpSpPr>
-              <a:xfrm>
-                <a:off x="4925531" y="4255511"/>
-                <a:ext cx="542732" cy="368304"/>
-                <a:chOff x="1634761" y="4134434"/>
-                <a:chExt cx="761663" cy="516873"/>
-              </a:xfrm>
-            </p:grpSpPr>
-            <p:cxnSp>
-              <p:nvCxnSpPr>
-                <p:cNvPr id="28" name="Straight Connector 27">
-                  <a:extLst>
-                    <a:ext uri="{FF2B5EF4-FFF2-40B4-BE49-F238E27FC236}">
-                      <a16:creationId xmlns:a16="http://schemas.microsoft.com/office/drawing/2014/main" id="{DBEA6B19-92BC-CA4F-BDD9-9B92A98A954B}"/>
-                    </a:ext>
-                  </a:extLst>
-                </p:cNvPr>
-                <p:cNvCxnSpPr/>
-                <p:nvPr/>
-              </p:nvCxnSpPr>
-              <p:spPr>
-                <a:xfrm flipH="1">
-                  <a:off x="1634761" y="4134434"/>
-                  <a:ext cx="761663" cy="123825"/>
-                </a:xfrm>
-                <a:prstGeom prst="line">
-                  <a:avLst/>
-                </a:prstGeom>
-                <a:ln>
-                  <a:solidFill>
-                    <a:schemeClr val="tx1"/>
-                  </a:solidFill>
-                  <a:headEnd type="oval" w="med" len="med"/>
-                  <a:tailEnd type="oval" w="med" len="med"/>
-                </a:ln>
-              </p:spPr>
-              <p:style>
-                <a:lnRef idx="1">
-                  <a:schemeClr val="accent1"/>
-                </a:lnRef>
-                <a:fillRef idx="0">
-                  <a:schemeClr val="accent1"/>
-                </a:fillRef>
-                <a:effectRef idx="0">
-                  <a:schemeClr val="accent1"/>
-                </a:effectRef>
-                <a:fontRef idx="minor">
-                  <a:schemeClr val="tx1"/>
-                </a:fontRef>
-              </p:style>
-            </p:cxnSp>
-            <p:cxnSp>
-              <p:nvCxnSpPr>
-                <p:cNvPr id="29" name="Straight Connector 28">
-                  <a:extLst>
-                    <a:ext uri="{FF2B5EF4-FFF2-40B4-BE49-F238E27FC236}">
-                      <a16:creationId xmlns:a16="http://schemas.microsoft.com/office/drawing/2014/main" id="{D411427B-8DF4-8149-87F0-1746D009235B}"/>
-                    </a:ext>
-                  </a:extLst>
-                </p:cNvPr>
-                <p:cNvCxnSpPr>
-                  <a:cxnSpLocks/>
-                </p:cNvCxnSpPr>
-                <p:nvPr/>
-              </p:nvCxnSpPr>
-              <p:spPr>
-                <a:xfrm>
-                  <a:off x="1634762" y="4258259"/>
-                  <a:ext cx="380830" cy="393048"/>
-                </a:xfrm>
-                <a:prstGeom prst="line">
-                  <a:avLst/>
-                </a:prstGeom>
-                <a:ln>
-                  <a:solidFill>
-                    <a:schemeClr val="tx1"/>
-                  </a:solidFill>
-                  <a:headEnd type="oval" w="med" len="med"/>
-                  <a:tailEnd type="oval" w="med" len="med"/>
-                </a:ln>
-              </p:spPr>
-              <p:style>
-                <a:lnRef idx="1">
-                  <a:schemeClr val="accent1"/>
-                </a:lnRef>
-                <a:fillRef idx="0">
-                  <a:schemeClr val="accent1"/>
-                </a:fillRef>
-                <a:effectRef idx="0">
-                  <a:schemeClr val="accent1"/>
-                </a:effectRef>
-                <a:fontRef idx="minor">
-                  <a:schemeClr val="tx1"/>
-                </a:fontRef>
-              </p:style>
-            </p:cxnSp>
-          </p:grpSp>
-          <p:grpSp>
-            <p:nvGrpSpPr>
-              <p:cNvPr id="30" name="Group 29">
-                <a:extLst>
-                  <a:ext uri="{FF2B5EF4-FFF2-40B4-BE49-F238E27FC236}">
-                    <a16:creationId xmlns:a16="http://schemas.microsoft.com/office/drawing/2014/main" id="{F1746FB6-7C6B-054A-A7BC-04F49966A136}"/>
-                  </a:ext>
-                </a:extLst>
-              </p:cNvPr>
-              <p:cNvGrpSpPr/>
-              <p:nvPr/>
-            </p:nvGrpSpPr>
-            <p:grpSpPr>
-              <a:xfrm rot="19534479">
-                <a:off x="6052990" y="3543417"/>
-                <a:ext cx="542732" cy="368304"/>
-                <a:chOff x="1634761" y="4134434"/>
-                <a:chExt cx="761663" cy="516873"/>
-              </a:xfrm>
-            </p:grpSpPr>
-            <p:cxnSp>
-              <p:nvCxnSpPr>
-                <p:cNvPr id="31" name="Straight Connector 30">
-                  <a:extLst>
-                    <a:ext uri="{FF2B5EF4-FFF2-40B4-BE49-F238E27FC236}">
-                      <a16:creationId xmlns:a16="http://schemas.microsoft.com/office/drawing/2014/main" id="{065A7E36-BE69-A447-A61C-C41B574E2586}"/>
-                    </a:ext>
-                  </a:extLst>
-                </p:cNvPr>
-                <p:cNvCxnSpPr/>
-                <p:nvPr/>
-              </p:nvCxnSpPr>
-              <p:spPr>
-                <a:xfrm flipH="1">
-                  <a:off x="1634761" y="4134434"/>
-                  <a:ext cx="761663" cy="123825"/>
-                </a:xfrm>
-                <a:prstGeom prst="line">
-                  <a:avLst/>
-                </a:prstGeom>
-                <a:ln>
-                  <a:solidFill>
-                    <a:schemeClr val="tx1"/>
-                  </a:solidFill>
-                  <a:headEnd type="oval" w="med" len="med"/>
-                  <a:tailEnd type="oval" w="med" len="med"/>
-                </a:ln>
-              </p:spPr>
-              <p:style>
-                <a:lnRef idx="1">
-                  <a:schemeClr val="accent1"/>
-                </a:lnRef>
-                <a:fillRef idx="0">
-                  <a:schemeClr val="accent1"/>
-                </a:fillRef>
-                <a:effectRef idx="0">
-                  <a:schemeClr val="accent1"/>
-                </a:effectRef>
-                <a:fontRef idx="minor">
-                  <a:schemeClr val="tx1"/>
-                </a:fontRef>
-              </p:style>
-            </p:cxnSp>
-            <p:cxnSp>
-              <p:nvCxnSpPr>
-                <p:cNvPr id="32" name="Straight Connector 31">
-                  <a:extLst>
-                    <a:ext uri="{FF2B5EF4-FFF2-40B4-BE49-F238E27FC236}">
-                      <a16:creationId xmlns:a16="http://schemas.microsoft.com/office/drawing/2014/main" id="{11B4E20C-EE40-F149-A139-AAAB22ED66A7}"/>
-                    </a:ext>
-                  </a:extLst>
-                </p:cNvPr>
-                <p:cNvCxnSpPr>
-                  <a:cxnSpLocks/>
-                </p:cNvCxnSpPr>
-                <p:nvPr/>
-              </p:nvCxnSpPr>
-              <p:spPr>
-                <a:xfrm>
-                  <a:off x="1634762" y="4258259"/>
-                  <a:ext cx="380830" cy="393048"/>
-                </a:xfrm>
-                <a:prstGeom prst="line">
-                  <a:avLst/>
-                </a:prstGeom>
-                <a:ln>
-                  <a:solidFill>
-                    <a:schemeClr val="tx1"/>
-                  </a:solidFill>
-                  <a:headEnd type="oval" w="med" len="med"/>
-                  <a:tailEnd type="oval" w="med" len="med"/>
-                </a:ln>
-              </p:spPr>
-              <p:style>
-                <a:lnRef idx="1">
-                  <a:schemeClr val="accent1"/>
-                </a:lnRef>
-                <a:fillRef idx="0">
-                  <a:schemeClr val="accent1"/>
-                </a:fillRef>
-                <a:effectRef idx="0">
-                  <a:schemeClr val="accent1"/>
-                </a:effectRef>
-                <a:fontRef idx="minor">
-                  <a:schemeClr val="tx1"/>
-                </a:fontRef>
-              </p:style>
-            </p:cxnSp>
-          </p:grpSp>
-          <p:grpSp>
-            <p:nvGrpSpPr>
-              <p:cNvPr id="33" name="Group 32">
-                <a:extLst>
-                  <a:ext uri="{FF2B5EF4-FFF2-40B4-BE49-F238E27FC236}">
-                    <a16:creationId xmlns:a16="http://schemas.microsoft.com/office/drawing/2014/main" id="{8BEDD7CC-474C-9E46-8B9E-86D9A5DA8307}"/>
-                  </a:ext>
-                </a:extLst>
-              </p:cNvPr>
-              <p:cNvGrpSpPr/>
-              <p:nvPr/>
-            </p:nvGrpSpPr>
-            <p:grpSpPr>
-              <a:xfrm rot="19534479">
-                <a:off x="6967744" y="2736917"/>
-                <a:ext cx="542732" cy="368304"/>
-                <a:chOff x="1634761" y="4134434"/>
-                <a:chExt cx="761663" cy="516873"/>
-              </a:xfrm>
-            </p:grpSpPr>
-            <p:cxnSp>
-              <p:nvCxnSpPr>
-                <p:cNvPr id="34" name="Straight Connector 33">
-                  <a:extLst>
-                    <a:ext uri="{FF2B5EF4-FFF2-40B4-BE49-F238E27FC236}">
-                      <a16:creationId xmlns:a16="http://schemas.microsoft.com/office/drawing/2014/main" id="{19AB7001-A8FD-4445-99F9-30AD5EDFCC7F}"/>
-                    </a:ext>
-                  </a:extLst>
-                </p:cNvPr>
-                <p:cNvCxnSpPr/>
-                <p:nvPr/>
-              </p:nvCxnSpPr>
-              <p:spPr>
-                <a:xfrm flipH="1">
-                  <a:off x="1634761" y="4134434"/>
-                  <a:ext cx="761663" cy="123825"/>
-                </a:xfrm>
-                <a:prstGeom prst="line">
-                  <a:avLst/>
-                </a:prstGeom>
-                <a:ln>
-                  <a:solidFill>
-                    <a:schemeClr val="tx1"/>
-                  </a:solidFill>
-                  <a:headEnd type="oval" w="med" len="med"/>
-                  <a:tailEnd type="oval" w="med" len="med"/>
-                </a:ln>
-              </p:spPr>
-              <p:style>
-                <a:lnRef idx="1">
-                  <a:schemeClr val="accent1"/>
-                </a:lnRef>
-                <a:fillRef idx="0">
-                  <a:schemeClr val="accent1"/>
-                </a:fillRef>
-                <a:effectRef idx="0">
-                  <a:schemeClr val="accent1"/>
-                </a:effectRef>
-                <a:fontRef idx="minor">
-                  <a:schemeClr val="tx1"/>
-                </a:fontRef>
-              </p:style>
-            </p:cxnSp>
-            <p:cxnSp>
-              <p:nvCxnSpPr>
-                <p:cNvPr id="35" name="Straight Connector 34">
-                  <a:extLst>
-                    <a:ext uri="{FF2B5EF4-FFF2-40B4-BE49-F238E27FC236}">
-                      <a16:creationId xmlns:a16="http://schemas.microsoft.com/office/drawing/2014/main" id="{46A4B3A7-CF72-1843-911C-B2B64E3AC867}"/>
-                    </a:ext>
-                  </a:extLst>
-                </p:cNvPr>
-                <p:cNvCxnSpPr>
-                  <a:cxnSpLocks/>
-                </p:cNvCxnSpPr>
-                <p:nvPr/>
-              </p:nvCxnSpPr>
-              <p:spPr>
-                <a:xfrm>
-                  <a:off x="1634762" y="4258259"/>
-                  <a:ext cx="380830" cy="393048"/>
-                </a:xfrm>
-                <a:prstGeom prst="line">
-                  <a:avLst/>
-                </a:prstGeom>
-                <a:ln>
-                  <a:solidFill>
-                    <a:schemeClr val="tx1"/>
-                  </a:solidFill>
-                  <a:headEnd type="oval" w="med" len="med"/>
-                  <a:tailEnd type="oval" w="med" len="med"/>
-                </a:ln>
-              </p:spPr>
-              <p:style>
-                <a:lnRef idx="1">
-                  <a:schemeClr val="accent1"/>
-                </a:lnRef>
-                <a:fillRef idx="0">
-                  <a:schemeClr val="accent1"/>
-                </a:fillRef>
-                <a:effectRef idx="0">
-                  <a:schemeClr val="accent1"/>
-                </a:effectRef>
-                <a:fontRef idx="minor">
-                  <a:schemeClr val="tx1"/>
-                </a:fontRef>
-              </p:style>
-            </p:cxnSp>
-          </p:grpSp>
         </p:grpSp>
         <p:sp>
           <p:nvSpPr>
@@ -5001,8 +4786,8 @@
           </p:nvSpPr>
           <p:spPr>
             <a:xfrm rot="10800000">
-              <a:off x="4459737" y="5446792"/>
-              <a:ext cx="3251972" cy="947526"/>
+              <a:off x="3607495" y="4941366"/>
+              <a:ext cx="4897678" cy="1452945"/>
             </a:xfrm>
             <a:prstGeom prst="triangle">
               <a:avLst>
@@ -5056,9 +4841,9 @@
             <p:nvPr/>
           </p:nvSpPr>
           <p:spPr>
-            <a:xfrm rot="19052384">
-              <a:off x="3720661" y="1666032"/>
-              <a:ext cx="2783134" cy="1569660"/>
+            <a:xfrm>
+              <a:off x="4921639" y="4733057"/>
+              <a:ext cx="2348720" cy="1323439"/>
             </a:xfrm>
             <a:prstGeom prst="rect">
               <a:avLst/>
@@ -5073,10 +4858,10 @@
             <a:p>
               <a:pPr algn="ctr"/>
               <a:r>
-                <a:rPr lang="en-GB" sz="9600" b="0" cap="none" spc="0" dirty="0" err="1">
+                <a:rPr lang="en-GB" sz="8000" b="0" cap="none" spc="0" dirty="0" err="1">
                   <a:ln w="0"/>
                   <a:solidFill>
-                    <a:schemeClr val="accent1"/>
+                    <a:schemeClr val="bg1"/>
                   </a:solidFill>
                   <a:effectLst>
                     <a:outerShdw blurRad="38100" dist="19050" dir="2700000" algn="tl" rotWithShape="0">
@@ -5088,10 +4873,10 @@
                 </a:rPr>
                 <a:t>vjsim</a:t>
               </a:r>
-              <a:endParaRPr lang="en-GB" sz="9600" b="0" cap="none" spc="0" dirty="0">
+              <a:endParaRPr lang="en-GB" sz="8000" b="0" cap="none" spc="0" dirty="0">
                 <a:ln w="0"/>
                 <a:solidFill>
-                  <a:schemeClr val="accent1"/>
+                  <a:schemeClr val="bg1"/>
                 </a:solidFill>
                 <a:effectLst>
                   <a:outerShdw blurRad="38100" dist="19050" dir="2700000" algn="tl" rotWithShape="0">

</xml_diff>